<commit_message>
Amélioration du StoryBoard.pptx et du Sketch_UniversRE.bmpr (renommé)
</commit_message>
<xml_diff>
--- a/doc/StoryBoard.pptx
+++ b/doc/StoryBoard.pptx
@@ -9,7 +9,9 @@
     <p:sldId id="257" r:id="rId3"/>
     <p:sldId id="258" r:id="rId4"/>
     <p:sldId id="259" r:id="rId5"/>
-    <p:sldId id="260" r:id="rId6"/>
+    <p:sldId id="261" r:id="rId6"/>
+    <p:sldId id="260" r:id="rId7"/>
+    <p:sldId id="262" r:id="rId8"/>
   </p:sldIdLst>
   <p:sldSz cx="12192000" cy="6858000"/>
   <p:notesSz cx="6858000" cy="9144000"/>
@@ -4343,41 +4345,6 @@
           </a:p>
         </p:txBody>
       </p:sp>
-      <p:sp>
-        <p:nvSpPr>
-          <p:cNvPr id="10" name="ZoneTexte 9">
-            <a:extLst>
-              <a:ext uri="{FF2B5EF4-FFF2-40B4-BE49-F238E27FC236}">
-                <a16:creationId xmlns:a16="http://schemas.microsoft.com/office/drawing/2014/main" id="{643D303C-2D39-403A-A299-EF15B86611C2}"/>
-              </a:ext>
-            </a:extLst>
-          </p:cNvPr>
-          <p:cNvSpPr txBox="1"/>
-          <p:nvPr/>
-        </p:nvSpPr>
-        <p:spPr>
-          <a:xfrm>
-            <a:off x="9477308" y="4891023"/>
-            <a:ext cx="2147467" cy="1754326"/>
-          </a:xfrm>
-          <a:prstGeom prst="rect">
-            <a:avLst/>
-          </a:prstGeom>
-          <a:noFill/>
-        </p:spPr>
-        <p:txBody>
-          <a:bodyPr wrap="square" rtlCol="0">
-            <a:spAutoFit/>
-          </a:bodyPr>
-          <a:lstStyle/>
-          <a:p>
-            <a:r>
-              <a:rPr lang="fr-FR" dirty="0"/>
-              <a:t>Occasionnellement, un avertissement « aucun élément ne correspond à la recherche » peut s’afficher.</a:t>
-            </a:r>
-          </a:p>
-        </p:txBody>
-      </p:sp>
     </p:spTree>
     <p:extLst>
       <p:ext uri="{BB962C8B-B14F-4D97-AF65-F5344CB8AC3E}">
@@ -4410,10 +4377,10 @@
       </p:grpSpPr>
       <p:sp>
         <p:nvSpPr>
-          <p:cNvPr id="4" name="Titre 1">
-            <a:extLst>
-              <a:ext uri="{FF2B5EF4-FFF2-40B4-BE49-F238E27FC236}">
-                <a16:creationId xmlns:a16="http://schemas.microsoft.com/office/drawing/2014/main" id="{D4BED95B-1067-41B5-810F-F52BF6AFA1DA}"/>
+          <p:cNvPr id="7" name="Titre 1">
+            <a:extLst>
+              <a:ext uri="{FF2B5EF4-FFF2-40B4-BE49-F238E27FC236}">
+                <a16:creationId xmlns:a16="http://schemas.microsoft.com/office/drawing/2014/main" id="{4F93F9EB-D0A9-43C8-90DE-C67E418BB2C0}"/>
               </a:ext>
             </a:extLst>
           </p:cNvPr>
@@ -4462,17 +4429,17 @@
             </a:r>
             <a:r>
               <a:rPr lang="fr-FR" dirty="0"/>
-              <a:t> Favoris </a:t>
+              <a:t> recherche avertissement</a:t>
             </a:r>
           </a:p>
         </p:txBody>
       </p:sp>
       <p:pic>
         <p:nvPicPr>
-          <p:cNvPr id="6" name="Image 5" descr="Une image contenant capture d’écran&#10;&#10;Description générée automatiquement">
-            <a:extLst>
-              <a:ext uri="{FF2B5EF4-FFF2-40B4-BE49-F238E27FC236}">
-                <a16:creationId xmlns:a16="http://schemas.microsoft.com/office/drawing/2014/main" id="{B4365487-2B56-4049-B178-950B69AE574C}"/>
+          <p:cNvPr id="9" name="Image 8" descr="Une image contenant capture d’écran&#10;&#10;Description générée automatiquement">
+            <a:extLst>
+              <a:ext uri="{FF2B5EF4-FFF2-40B4-BE49-F238E27FC236}">
+                <a16:creationId xmlns:a16="http://schemas.microsoft.com/office/drawing/2014/main" id="{72ADD8E1-E05D-4B9D-9435-BEDF065662CA}"/>
               </a:ext>
             </a:extLst>
           </p:cNvPr>
@@ -4495,7 +4462,7 @@
         </p:blipFill>
         <p:spPr>
           <a:xfrm>
-            <a:off x="0" y="1126727"/>
+            <a:off x="0" y="1190522"/>
             <a:ext cx="9050013" cy="6220693"/>
           </a:xfrm>
           <a:prstGeom prst="rect">
@@ -4505,10 +4472,10 @@
       </p:pic>
       <p:sp>
         <p:nvSpPr>
-          <p:cNvPr id="8" name="Flèche : droite 7">
-            <a:extLst>
-              <a:ext uri="{FF2B5EF4-FFF2-40B4-BE49-F238E27FC236}">
-                <a16:creationId xmlns:a16="http://schemas.microsoft.com/office/drawing/2014/main" id="{29DCB38F-7B49-489A-8A1C-437BE73984F2}"/>
+          <p:cNvPr id="10" name="Flèche : droite 9">
+            <a:extLst>
+              <a:ext uri="{FF2B5EF4-FFF2-40B4-BE49-F238E27FC236}">
+                <a16:creationId xmlns:a16="http://schemas.microsoft.com/office/drawing/2014/main" id="{164D8980-4EA9-4E98-A636-787B689EF3F9}"/>
               </a:ext>
             </a:extLst>
           </p:cNvPr>
@@ -4517,8 +4484,8 @@
         </p:nvSpPr>
         <p:spPr>
           <a:xfrm rot="10385725">
-            <a:off x="6741995" y="3700780"/>
-            <a:ext cx="2693271" cy="496177"/>
+            <a:off x="7500209" y="2936828"/>
+            <a:ext cx="1782309" cy="496177"/>
           </a:xfrm>
           <a:prstGeom prst="rightArrow">
             <a:avLst/>
@@ -4557,10 +4524,10 @@
       </p:sp>
       <p:sp>
         <p:nvSpPr>
-          <p:cNvPr id="10" name="ZoneTexte 9">
-            <a:extLst>
-              <a:ext uri="{FF2B5EF4-FFF2-40B4-BE49-F238E27FC236}">
-                <a16:creationId xmlns:a16="http://schemas.microsoft.com/office/drawing/2014/main" id="{29DA6D42-7A77-42C1-AD3E-D91DEE2E4C77}"/>
+          <p:cNvPr id="11" name="ZoneTexte 10">
+            <a:extLst>
+              <a:ext uri="{FF2B5EF4-FFF2-40B4-BE49-F238E27FC236}">
+                <a16:creationId xmlns:a16="http://schemas.microsoft.com/office/drawing/2014/main" id="{0C7529D0-EA7F-47B1-9C04-80D0EC3085A7}"/>
               </a:ext>
             </a:extLst>
           </p:cNvPr>
@@ -4569,8 +4536,8 @@
         </p:nvSpPr>
         <p:spPr>
           <a:xfrm>
-            <a:off x="9845749" y="2870791"/>
-            <a:ext cx="2105246" cy="2031325"/>
+            <a:off x="9268046" y="2348641"/>
+            <a:ext cx="2923954" cy="1200329"/>
           </a:xfrm>
           <a:prstGeom prst="rect">
             <a:avLst/>
@@ -4585,6 +4552,218 @@
           <a:p>
             <a:r>
               <a:rPr lang="fr-FR" dirty="0"/>
+              <a:t>Occasionnellement si la recherche n’abouti à aucun résultat alors un message d’avertissement est affiché.</a:t>
+            </a:r>
+          </a:p>
+        </p:txBody>
+      </p:sp>
+    </p:spTree>
+    <p:extLst>
+      <p:ext uri="{BB962C8B-B14F-4D97-AF65-F5344CB8AC3E}">
+        <p14:creationId xmlns:p14="http://schemas.microsoft.com/office/powerpoint/2010/main" val="580147149"/>
+      </p:ext>
+    </p:extLst>
+  </p:cSld>
+  <p:clrMapOvr>
+    <a:masterClrMapping/>
+  </p:clrMapOvr>
+</p:sld>
+</file>
+
+<file path=ppt/slides/slide6.xml><?xml version="1.0" encoding="utf-8"?>
+<p:sld xmlns:a="http://schemas.openxmlformats.org/drawingml/2006/main" xmlns:r="http://schemas.openxmlformats.org/officeDocument/2006/relationships" xmlns:p="http://schemas.openxmlformats.org/presentationml/2006/main">
+  <p:cSld>
+    <p:spTree>
+      <p:nvGrpSpPr>
+        <p:cNvPr id="1" name=""/>
+        <p:cNvGrpSpPr/>
+        <p:nvPr/>
+      </p:nvGrpSpPr>
+      <p:grpSpPr>
+        <a:xfrm>
+          <a:off x="0" y="0"/>
+          <a:ext cx="0" cy="0"/>
+          <a:chOff x="0" y="0"/>
+          <a:chExt cx="0" cy="0"/>
+        </a:xfrm>
+      </p:grpSpPr>
+      <p:sp>
+        <p:nvSpPr>
+          <p:cNvPr id="4" name="Titre 1">
+            <a:extLst>
+              <a:ext uri="{FF2B5EF4-FFF2-40B4-BE49-F238E27FC236}">
+                <a16:creationId xmlns:a16="http://schemas.microsoft.com/office/drawing/2014/main" id="{D4BED95B-1067-41B5-810F-F52BF6AFA1DA}"/>
+              </a:ext>
+            </a:extLst>
+          </p:cNvPr>
+          <p:cNvSpPr txBox="1">
+            <a:spLocks/>
+          </p:cNvSpPr>
+          <p:nvPr/>
+        </p:nvSpPr>
+        <p:spPr>
+          <a:xfrm>
+            <a:off x="1407042" y="180753"/>
+            <a:ext cx="9144000" cy="691118"/>
+          </a:xfrm>
+          <a:prstGeom prst="rect">
+            <a:avLst/>
+          </a:prstGeom>
+        </p:spPr>
+        <p:txBody>
+          <a:bodyPr vert="horz" lIns="91440" tIns="45720" rIns="91440" bIns="45720" rtlCol="0" anchor="ctr">
+            <a:normAutofit fontScale="97500"/>
+          </a:bodyPr>
+          <a:lstStyle>
+            <a:lvl1pPr algn="l" defTabSz="914400" rtl="0" eaLnBrk="1" latinLnBrk="0" hangingPunct="1">
+              <a:lnSpc>
+                <a:spcPct val="90000"/>
+              </a:lnSpc>
+              <a:spcBef>
+                <a:spcPct val="0"/>
+              </a:spcBef>
+              <a:buNone/>
+              <a:defRPr sz="4400" kern="1200">
+                <a:solidFill>
+                  <a:schemeClr val="tx1"/>
+                </a:solidFill>
+                <a:latin typeface="+mj-lt"/>
+                <a:ea typeface="+mj-ea"/>
+                <a:cs typeface="+mj-cs"/>
+              </a:defRPr>
+            </a:lvl1pPr>
+          </a:lstStyle>
+          <a:p>
+            <a:pPr algn="ctr"/>
+            <a:r>
+              <a:rPr lang="fr-FR" dirty="0" err="1"/>
+              <a:t>StoryBoard</a:t>
+            </a:r>
+            <a:r>
+              <a:rPr lang="fr-FR" dirty="0"/>
+              <a:t> Favoris </a:t>
+            </a:r>
+          </a:p>
+        </p:txBody>
+      </p:sp>
+      <p:pic>
+        <p:nvPicPr>
+          <p:cNvPr id="6" name="Image 5" descr="Une image contenant capture d’écran&#10;&#10;Description générée automatiquement">
+            <a:extLst>
+              <a:ext uri="{FF2B5EF4-FFF2-40B4-BE49-F238E27FC236}">
+                <a16:creationId xmlns:a16="http://schemas.microsoft.com/office/drawing/2014/main" id="{B4365487-2B56-4049-B178-950B69AE574C}"/>
+              </a:ext>
+            </a:extLst>
+          </p:cNvPr>
+          <p:cNvPicPr>
+            <a:picLocks noChangeAspect="1"/>
+          </p:cNvPicPr>
+          <p:nvPr/>
+        </p:nvPicPr>
+        <p:blipFill>
+          <a:blip r:embed="rId2">
+            <a:extLst>
+              <a:ext uri="{28A0092B-C50C-407E-A947-70E740481C1C}">
+                <a14:useLocalDpi xmlns:a14="http://schemas.microsoft.com/office/drawing/2010/main" val="0"/>
+              </a:ext>
+            </a:extLst>
+          </a:blip>
+          <a:stretch>
+            <a:fillRect/>
+          </a:stretch>
+        </p:blipFill>
+        <p:spPr>
+          <a:xfrm>
+            <a:off x="0" y="1126727"/>
+            <a:ext cx="9050013" cy="6220693"/>
+          </a:xfrm>
+          <a:prstGeom prst="rect">
+            <a:avLst/>
+          </a:prstGeom>
+        </p:spPr>
+      </p:pic>
+      <p:sp>
+        <p:nvSpPr>
+          <p:cNvPr id="8" name="Flèche : droite 7">
+            <a:extLst>
+              <a:ext uri="{FF2B5EF4-FFF2-40B4-BE49-F238E27FC236}">
+                <a16:creationId xmlns:a16="http://schemas.microsoft.com/office/drawing/2014/main" id="{29DCB38F-7B49-489A-8A1C-437BE73984F2}"/>
+              </a:ext>
+            </a:extLst>
+          </p:cNvPr>
+          <p:cNvSpPr/>
+          <p:nvPr/>
+        </p:nvSpPr>
+        <p:spPr>
+          <a:xfrm rot="10385725">
+            <a:off x="6741995" y="3700780"/>
+            <a:ext cx="2693271" cy="496177"/>
+          </a:xfrm>
+          <a:prstGeom prst="rightArrow">
+            <a:avLst/>
+          </a:prstGeom>
+          <a:noFill/>
+          <a:ln w="28575">
+            <a:solidFill>
+              <a:schemeClr val="accent1">
+                <a:lumMod val="50000"/>
+              </a:schemeClr>
+            </a:solidFill>
+          </a:ln>
+        </p:spPr>
+        <p:style>
+          <a:lnRef idx="1">
+            <a:schemeClr val="dk1"/>
+          </a:lnRef>
+          <a:fillRef idx="2">
+            <a:schemeClr val="dk1"/>
+          </a:fillRef>
+          <a:effectRef idx="1">
+            <a:schemeClr val="dk1"/>
+          </a:effectRef>
+          <a:fontRef idx="minor">
+            <a:schemeClr val="dk1"/>
+          </a:fontRef>
+        </p:style>
+        <p:txBody>
+          <a:bodyPr rtlCol="0" anchor="ctr"/>
+          <a:lstStyle/>
+          <a:p>
+            <a:pPr algn="ctr"/>
+            <a:endParaRPr lang="fr-FR"/>
+          </a:p>
+        </p:txBody>
+      </p:sp>
+      <p:sp>
+        <p:nvSpPr>
+          <p:cNvPr id="10" name="ZoneTexte 9">
+            <a:extLst>
+              <a:ext uri="{FF2B5EF4-FFF2-40B4-BE49-F238E27FC236}">
+                <a16:creationId xmlns:a16="http://schemas.microsoft.com/office/drawing/2014/main" id="{29DA6D42-7A77-42C1-AD3E-D91DEE2E4C77}"/>
+              </a:ext>
+            </a:extLst>
+          </p:cNvPr>
+          <p:cNvSpPr txBox="1"/>
+          <p:nvPr/>
+        </p:nvSpPr>
+        <p:spPr>
+          <a:xfrm>
+            <a:off x="9845749" y="2870791"/>
+            <a:ext cx="2105246" cy="2031325"/>
+          </a:xfrm>
+          <a:prstGeom prst="rect">
+            <a:avLst/>
+          </a:prstGeom>
+          <a:noFill/>
+        </p:spPr>
+        <p:txBody>
+          <a:bodyPr wrap="square" rtlCol="0">
+            <a:spAutoFit/>
+          </a:bodyPr>
+          <a:lstStyle/>
+          <a:p>
+            <a:r>
+              <a:rPr lang="fr-FR" dirty="0"/>
               <a:t>Après avoir sélectionné la catégorie favoris, l’utilisateur peut supprimer un élément de cette liste de favoris.</a:t>
             </a:r>
           </a:p>
@@ -4594,6 +4773,218 @@
     <p:extLst>
       <p:ext uri="{BB962C8B-B14F-4D97-AF65-F5344CB8AC3E}">
         <p14:creationId xmlns:p14="http://schemas.microsoft.com/office/powerpoint/2010/main" val="736642629"/>
+      </p:ext>
+    </p:extLst>
+  </p:cSld>
+  <p:clrMapOvr>
+    <a:masterClrMapping/>
+  </p:clrMapOvr>
+</p:sld>
+</file>
+
+<file path=ppt/slides/slide7.xml><?xml version="1.0" encoding="utf-8"?>
+<p:sld xmlns:a="http://schemas.openxmlformats.org/drawingml/2006/main" xmlns:r="http://schemas.openxmlformats.org/officeDocument/2006/relationships" xmlns:p="http://schemas.openxmlformats.org/presentationml/2006/main">
+  <p:cSld>
+    <p:spTree>
+      <p:nvGrpSpPr>
+        <p:cNvPr id="1" name=""/>
+        <p:cNvGrpSpPr/>
+        <p:nvPr/>
+      </p:nvGrpSpPr>
+      <p:grpSpPr>
+        <a:xfrm>
+          <a:off x="0" y="0"/>
+          <a:ext cx="0" cy="0"/>
+          <a:chOff x="0" y="0"/>
+          <a:chExt cx="0" cy="0"/>
+        </a:xfrm>
+      </p:grpSpPr>
+      <p:sp>
+        <p:nvSpPr>
+          <p:cNvPr id="4" name="Titre 1">
+            <a:extLst>
+              <a:ext uri="{FF2B5EF4-FFF2-40B4-BE49-F238E27FC236}">
+                <a16:creationId xmlns:a16="http://schemas.microsoft.com/office/drawing/2014/main" id="{1106EA51-C86B-48C6-A15F-E3F099D33205}"/>
+              </a:ext>
+            </a:extLst>
+          </p:cNvPr>
+          <p:cNvSpPr txBox="1">
+            <a:spLocks/>
+          </p:cNvSpPr>
+          <p:nvPr/>
+        </p:nvSpPr>
+        <p:spPr>
+          <a:xfrm>
+            <a:off x="1407042" y="180753"/>
+            <a:ext cx="9144000" cy="691118"/>
+          </a:xfrm>
+          <a:prstGeom prst="rect">
+            <a:avLst/>
+          </a:prstGeom>
+        </p:spPr>
+        <p:txBody>
+          <a:bodyPr vert="horz" lIns="91440" tIns="45720" rIns="91440" bIns="45720" rtlCol="0" anchor="ctr">
+            <a:normAutofit fontScale="97500"/>
+          </a:bodyPr>
+          <a:lstStyle>
+            <a:lvl1pPr algn="l" defTabSz="914400" rtl="0" eaLnBrk="1" latinLnBrk="0" hangingPunct="1">
+              <a:lnSpc>
+                <a:spcPct val="90000"/>
+              </a:lnSpc>
+              <a:spcBef>
+                <a:spcPct val="0"/>
+              </a:spcBef>
+              <a:buNone/>
+              <a:defRPr sz="4400" kern="1200">
+                <a:solidFill>
+                  <a:schemeClr val="tx1"/>
+                </a:solidFill>
+                <a:latin typeface="+mj-lt"/>
+                <a:ea typeface="+mj-ea"/>
+                <a:cs typeface="+mj-cs"/>
+              </a:defRPr>
+            </a:lvl1pPr>
+          </a:lstStyle>
+          <a:p>
+            <a:pPr algn="ctr"/>
+            <a:r>
+              <a:rPr lang="fr-FR" dirty="0" err="1"/>
+              <a:t>StoryBoard</a:t>
+            </a:r>
+            <a:r>
+              <a:rPr lang="fr-FR" dirty="0"/>
+              <a:t> Favoris avertissement</a:t>
+            </a:r>
+          </a:p>
+        </p:txBody>
+      </p:sp>
+      <p:pic>
+        <p:nvPicPr>
+          <p:cNvPr id="6" name="Image 5" descr="Une image contenant capture d’écran&#10;&#10;Description générée automatiquement">
+            <a:extLst>
+              <a:ext uri="{FF2B5EF4-FFF2-40B4-BE49-F238E27FC236}">
+                <a16:creationId xmlns:a16="http://schemas.microsoft.com/office/drawing/2014/main" id="{09609031-E422-4670-905E-404985D29322}"/>
+              </a:ext>
+            </a:extLst>
+          </p:cNvPr>
+          <p:cNvPicPr>
+            <a:picLocks noChangeAspect="1"/>
+          </p:cNvPicPr>
+          <p:nvPr/>
+        </p:nvPicPr>
+        <p:blipFill>
+          <a:blip r:embed="rId2">
+            <a:extLst>
+              <a:ext uri="{28A0092B-C50C-407E-A947-70E740481C1C}">
+                <a14:useLocalDpi xmlns:a14="http://schemas.microsoft.com/office/drawing/2010/main" val="0"/>
+              </a:ext>
+            </a:extLst>
+          </a:blip>
+          <a:stretch>
+            <a:fillRect/>
+          </a:stretch>
+        </p:blipFill>
+        <p:spPr>
+          <a:xfrm>
+            <a:off x="0" y="1041667"/>
+            <a:ext cx="9050013" cy="6220693"/>
+          </a:xfrm>
+          <a:prstGeom prst="rect">
+            <a:avLst/>
+          </a:prstGeom>
+        </p:spPr>
+      </p:pic>
+      <p:sp>
+        <p:nvSpPr>
+          <p:cNvPr id="7" name="Flèche : droite 6">
+            <a:extLst>
+              <a:ext uri="{FF2B5EF4-FFF2-40B4-BE49-F238E27FC236}">
+                <a16:creationId xmlns:a16="http://schemas.microsoft.com/office/drawing/2014/main" id="{F5474BF5-872C-42DE-A617-2743D4126118}"/>
+              </a:ext>
+            </a:extLst>
+          </p:cNvPr>
+          <p:cNvSpPr/>
+          <p:nvPr/>
+        </p:nvSpPr>
+        <p:spPr>
+          <a:xfrm rot="10385725">
+            <a:off x="6848320" y="2772735"/>
+            <a:ext cx="2693271" cy="496177"/>
+          </a:xfrm>
+          <a:prstGeom prst="rightArrow">
+            <a:avLst/>
+          </a:prstGeom>
+          <a:noFill/>
+          <a:ln w="28575">
+            <a:solidFill>
+              <a:schemeClr val="accent1">
+                <a:lumMod val="50000"/>
+              </a:schemeClr>
+            </a:solidFill>
+          </a:ln>
+        </p:spPr>
+        <p:style>
+          <a:lnRef idx="1">
+            <a:schemeClr val="dk1"/>
+          </a:lnRef>
+          <a:fillRef idx="2">
+            <a:schemeClr val="dk1"/>
+          </a:fillRef>
+          <a:effectRef idx="1">
+            <a:schemeClr val="dk1"/>
+          </a:effectRef>
+          <a:fontRef idx="minor">
+            <a:schemeClr val="dk1"/>
+          </a:fontRef>
+        </p:style>
+        <p:txBody>
+          <a:bodyPr rtlCol="0" anchor="ctr"/>
+          <a:lstStyle/>
+          <a:p>
+            <a:pPr algn="ctr"/>
+            <a:endParaRPr lang="fr-FR" dirty="0"/>
+          </a:p>
+        </p:txBody>
+      </p:sp>
+      <p:sp>
+        <p:nvSpPr>
+          <p:cNvPr id="8" name="ZoneTexte 7">
+            <a:extLst>
+              <a:ext uri="{FF2B5EF4-FFF2-40B4-BE49-F238E27FC236}">
+                <a16:creationId xmlns:a16="http://schemas.microsoft.com/office/drawing/2014/main" id="{13DCAD3A-71AC-450F-B853-A495D0093F7A}"/>
+              </a:ext>
+            </a:extLst>
+          </p:cNvPr>
+          <p:cNvSpPr txBox="1"/>
+          <p:nvPr/>
+        </p:nvSpPr>
+        <p:spPr>
+          <a:xfrm>
+            <a:off x="9696893" y="2179674"/>
+            <a:ext cx="2495107" cy="1200329"/>
+          </a:xfrm>
+          <a:prstGeom prst="rect">
+            <a:avLst/>
+          </a:prstGeom>
+          <a:noFill/>
+        </p:spPr>
+        <p:txBody>
+          <a:bodyPr wrap="square" rtlCol="0">
+            <a:spAutoFit/>
+          </a:bodyPr>
+          <a:lstStyle/>
+          <a:p>
+            <a:r>
+              <a:rPr lang="fr-FR" dirty="0"/>
+              <a:t>Si l’utilisateur n’a aucun favoris, alors un avertissement est affiché.</a:t>
+            </a:r>
+          </a:p>
+        </p:txBody>
+      </p:sp>
+    </p:spTree>
+    <p:extLst>
+      <p:ext uri="{BB962C8B-B14F-4D97-AF65-F5344CB8AC3E}">
+        <p14:creationId xmlns:p14="http://schemas.microsoft.com/office/powerpoint/2010/main" val="581058012"/>
       </p:ext>
     </p:extLst>
   </p:cSld>

</xml_diff>